<commit_message>
apcs 3 lecs update
</commit_message>
<xml_diff>
--- a/courses/apcsp/lect1.pptx
+++ b/courses/apcsp/lect1.pptx
@@ -25,10 +25,12 @@
     <p:sldId id="271" r:id="rId19"/>
     <p:sldId id="272" r:id="rId20"/>
     <p:sldId id="293" r:id="rId21"/>
-    <p:sldId id="281" r:id="rId22"/>
-    <p:sldId id="302" r:id="rId23"/>
-    <p:sldId id="303" r:id="rId24"/>
-    <p:sldId id="284" r:id="rId25"/>
+    <p:sldId id="295" r:id="rId22"/>
+    <p:sldId id="281" r:id="rId23"/>
+    <p:sldId id="280" r:id="rId24"/>
+    <p:sldId id="302" r:id="rId25"/>
+    <p:sldId id="303" r:id="rId26"/>
+    <p:sldId id="284" r:id="rId27"/>
   </p:sldIdLst>
   <p:sldSz cx="9144000" cy="5715000" type="screen16x10"/>
   <p:notesSz cx="6858000" cy="9144000"/>
@@ -138,7 +140,7 @@
 <file path=ppt/revisionInfo.xml><?xml version="1.0" encoding="utf-8"?>
 <p1510:revInfo xmlns:a="http://schemas.openxmlformats.org/drawingml/2006/main" xmlns:r="http://schemas.openxmlformats.org/officeDocument/2006/relationships" xmlns:p1510="http://schemas.microsoft.com/office/powerpoint/2015/10/main">
   <p1510:revLst>
-    <p1510:client id="{1AE11430-C232-BB4B-AD26-649DB56977B5}" v="1352" dt="2019-09-07T18:03:39.454"/>
+    <p1510:client id="{1AE11430-C232-BB4B-AD26-649DB56977B5}" v="1375" dt="2019-09-08T13:43:19.919"/>
   </p1510:revLst>
 </p1510:revInfo>
 </file>
@@ -419,19 +421,19 @@
   </pc:docChgLst>
   <pc:docChgLst>
     <pc:chgData name="Long B Nguyen" userId="f59fb8f3-a021-417a-8bc1-65c8d471c621" providerId="ADAL" clId="{1AE11430-C232-BB4B-AD26-649DB56977B5}"/>
-    <pc:docChg chg="undo custSel addSld delSld modSld">
-      <pc:chgData name="Long B Nguyen" userId="f59fb8f3-a021-417a-8bc1-65c8d471c621" providerId="ADAL" clId="{1AE11430-C232-BB4B-AD26-649DB56977B5}" dt="2019-09-08T00:54:16.876" v="3685" actId="20577"/>
+    <pc:docChg chg="undo redo custSel addSld delSld modSld">
+      <pc:chgData name="Long B Nguyen" userId="f59fb8f3-a021-417a-8bc1-65c8d471c621" providerId="ADAL" clId="{1AE11430-C232-BB4B-AD26-649DB56977B5}" dt="2019-09-08T13:43:19.919" v="3758" actId="20577"/>
       <pc:docMkLst>
         <pc:docMk/>
       </pc:docMkLst>
       <pc:sldChg chg="modSp modAnim">
-        <pc:chgData name="Long B Nguyen" userId="f59fb8f3-a021-417a-8bc1-65c8d471c621" providerId="ADAL" clId="{1AE11430-C232-BB4B-AD26-649DB56977B5}" dt="2019-09-07T18:02:27.916" v="3554" actId="20577"/>
+        <pc:chgData name="Long B Nguyen" userId="f59fb8f3-a021-417a-8bc1-65c8d471c621" providerId="ADAL" clId="{1AE11430-C232-BB4B-AD26-649DB56977B5}" dt="2019-09-08T13:43:19.919" v="3758" actId="20577"/>
         <pc:sldMkLst>
           <pc:docMk/>
           <pc:sldMk cId="2207246265" sldId="257"/>
         </pc:sldMkLst>
         <pc:spChg chg="mod">
-          <ac:chgData name="Long B Nguyen" userId="f59fb8f3-a021-417a-8bc1-65c8d471c621" providerId="ADAL" clId="{1AE11430-C232-BB4B-AD26-649DB56977B5}" dt="2019-09-07T18:02:27.916" v="3554" actId="20577"/>
+          <ac:chgData name="Long B Nguyen" userId="f59fb8f3-a021-417a-8bc1-65c8d471c621" providerId="ADAL" clId="{1AE11430-C232-BB4B-AD26-649DB56977B5}" dt="2019-09-08T13:43:19.919" v="3758" actId="20577"/>
           <ac:spMkLst>
             <pc:docMk/>
             <pc:sldMk cId="2207246265" sldId="257"/>
@@ -565,6 +567,13 @@
           <pc:sldMk cId="587435069" sldId="272"/>
         </pc:sldMkLst>
       </pc:sldChg>
+      <pc:sldChg chg="add">
+        <pc:chgData name="Long B Nguyen" userId="f59fb8f3-a021-417a-8bc1-65c8d471c621" providerId="ADAL" clId="{1AE11430-C232-BB4B-AD26-649DB56977B5}" dt="2019-09-08T13:30:23" v="3743"/>
+        <pc:sldMkLst>
+          <pc:docMk/>
+          <pc:sldMk cId="2925367410" sldId="280"/>
+        </pc:sldMkLst>
+      </pc:sldChg>
       <pc:sldChg chg="addSp modSp add">
         <pc:chgData name="Long B Nguyen" userId="f59fb8f3-a021-417a-8bc1-65c8d471c621" providerId="ADAL" clId="{1AE11430-C232-BB4B-AD26-649DB56977B5}" dt="2019-09-08T00:53:48.725" v="3683" actId="20577"/>
         <pc:sldMkLst>
@@ -611,13 +620,13 @@
         </pc:sldMkLst>
       </pc:sldChg>
       <pc:sldChg chg="modSp">
-        <pc:chgData name="Long B Nguyen" userId="f59fb8f3-a021-417a-8bc1-65c8d471c621" providerId="ADAL" clId="{1AE11430-C232-BB4B-AD26-649DB56977B5}" dt="2019-09-07T18:02:21.123" v="3545" actId="14100"/>
+        <pc:chgData name="Long B Nguyen" userId="f59fb8f3-a021-417a-8bc1-65c8d471c621" providerId="ADAL" clId="{1AE11430-C232-BB4B-AD26-649DB56977B5}" dt="2019-09-08T13:30:11.346" v="3742" actId="20577"/>
         <pc:sldMkLst>
           <pc:docMk/>
           <pc:sldMk cId="3974060782" sldId="289"/>
         </pc:sldMkLst>
         <pc:spChg chg="mod">
-          <ac:chgData name="Long B Nguyen" userId="f59fb8f3-a021-417a-8bc1-65c8d471c621" providerId="ADAL" clId="{1AE11430-C232-BB4B-AD26-649DB56977B5}" dt="2019-09-07T18:02:21.123" v="3545" actId="14100"/>
+          <ac:chgData name="Long B Nguyen" userId="f59fb8f3-a021-417a-8bc1-65c8d471c621" providerId="ADAL" clId="{1AE11430-C232-BB4B-AD26-649DB56977B5}" dt="2019-09-08T13:30:11.346" v="3742" actId="20577"/>
           <ac:spMkLst>
             <pc:docMk/>
             <pc:sldMk cId="3974060782" sldId="289"/>
@@ -639,6 +648,35 @@
             <ac:spMk id="3" creationId="{4D0CDBB4-7D15-3740-9E57-F40B8D812406}"/>
           </ac:spMkLst>
         </pc:spChg>
+      </pc:sldChg>
+      <pc:sldChg chg="add del">
+        <pc:chgData name="Long B Nguyen" userId="f59fb8f3-a021-417a-8bc1-65c8d471c621" providerId="ADAL" clId="{1AE11430-C232-BB4B-AD26-649DB56977B5}" dt="2019-09-08T13:30:25.596" v="3744" actId="2696"/>
+        <pc:sldMkLst>
+          <pc:docMk/>
+          <pc:sldMk cId="1406993528" sldId="295"/>
+        </pc:sldMkLst>
+      </pc:sldChg>
+      <pc:sldChg chg="modSp add del">
+        <pc:chgData name="Long B Nguyen" userId="f59fb8f3-a021-417a-8bc1-65c8d471c621" providerId="ADAL" clId="{1AE11430-C232-BB4B-AD26-649DB56977B5}" dt="2019-09-08T03:40:41.216" v="3694"/>
+        <pc:sldMkLst>
+          <pc:docMk/>
+          <pc:sldMk cId="3617353163" sldId="295"/>
+        </pc:sldMkLst>
+        <pc:spChg chg="mod">
+          <ac:chgData name="Long B Nguyen" userId="f59fb8f3-a021-417a-8bc1-65c8d471c621" providerId="ADAL" clId="{1AE11430-C232-BB4B-AD26-649DB56977B5}" dt="2019-09-08T03:40:41.011" v="3693" actId="20577"/>
+          <ac:spMkLst>
+            <pc:docMk/>
+            <pc:sldMk cId="3617353163" sldId="295"/>
+            <ac:spMk id="9" creationId="{E3B2E017-30B2-884B-A113-B419A2ED51AD}"/>
+          </ac:spMkLst>
+        </pc:spChg>
+      </pc:sldChg>
+      <pc:sldChg chg="add">
+        <pc:chgData name="Long B Nguyen" userId="f59fb8f3-a021-417a-8bc1-65c8d471c621" providerId="ADAL" clId="{1AE11430-C232-BB4B-AD26-649DB56977B5}" dt="2019-09-08T13:30:27.987" v="3745"/>
+        <pc:sldMkLst>
+          <pc:docMk/>
+          <pc:sldMk cId="3711861066" sldId="295"/>
+        </pc:sldMkLst>
       </pc:sldChg>
       <pc:sldChg chg="addSp modSp">
         <pc:chgData name="Long B Nguyen" userId="f59fb8f3-a021-417a-8bc1-65c8d471c621" providerId="ADAL" clId="{1AE11430-C232-BB4B-AD26-649DB56977B5}" dt="2019-09-06T12:07:28.617" v="1782" actId="1036"/>
@@ -929,6 +967,13 @@
           </ac:spMkLst>
         </pc:spChg>
       </pc:sldChg>
+      <pc:sldChg chg="add del">
+        <pc:chgData name="Long B Nguyen" userId="f59fb8f3-a021-417a-8bc1-65c8d471c621" providerId="ADAL" clId="{1AE11430-C232-BB4B-AD26-649DB56977B5}" dt="2019-09-08T03:41:42.114" v="3702" actId="2696"/>
+        <pc:sldMkLst>
+          <pc:docMk/>
+          <pc:sldMk cId="1735411058" sldId="304"/>
+        </pc:sldMkLst>
+      </pc:sldChg>
     </pc:docChg>
   </pc:docChgLst>
 </pc:chgInfo>
@@ -1065,7 +1110,7 @@
           <a:p>
             <a:fld id="{4AAD347D-5ACD-4C99-B74B-A9C85AD731AF}" type="datetimeFigureOut">
               <a:rPr lang="en-US" smtClean="0"/>
-              <a:t>9/7/19</a:t>
+              <a:t>9/8/19</a:t>
             </a:fld>
             <a:endParaRPr lang="en-US" dirty="0"/>
           </a:p>
@@ -1235,7 +1280,7 @@
           <a:p>
             <a:fld id="{4509A250-FF31-4206-8172-F9D3106AACB1}" type="datetimeFigureOut">
               <a:rPr lang="en-US" smtClean="0"/>
-              <a:t>9/7/19</a:t>
+              <a:t>9/8/19</a:t>
             </a:fld>
             <a:endParaRPr lang="en-US" dirty="0"/>
           </a:p>
@@ -1415,7 +1460,7 @@
           <a:p>
             <a:fld id="{4509A250-FF31-4206-8172-F9D3106AACB1}" type="datetimeFigureOut">
               <a:rPr lang="en-US" smtClean="0"/>
-              <a:t>9/7/19</a:t>
+              <a:t>9/8/19</a:t>
             </a:fld>
             <a:endParaRPr lang="en-US" dirty="0"/>
           </a:p>
@@ -1585,7 +1630,7 @@
           <a:p>
             <a:fld id="{4509A250-FF31-4206-8172-F9D3106AACB1}" type="datetimeFigureOut">
               <a:rPr lang="en-US" smtClean="0"/>
-              <a:t>9/7/19</a:t>
+              <a:t>9/8/19</a:t>
             </a:fld>
             <a:endParaRPr lang="en-US" dirty="0"/>
           </a:p>
@@ -1831,7 +1876,7 @@
           <a:p>
             <a:fld id="{9796027F-7875-4030-9381-8BD8C4F21935}" type="datetimeFigureOut">
               <a:rPr lang="en-US" smtClean="0"/>
-              <a:t>9/7/19</a:t>
+              <a:t>9/8/19</a:t>
             </a:fld>
             <a:endParaRPr lang="en-US" dirty="0"/>
           </a:p>
@@ -2063,7 +2108,7 @@
           <a:p>
             <a:fld id="{9796027F-7875-4030-9381-8BD8C4F21935}" type="datetimeFigureOut">
               <a:rPr lang="en-US" smtClean="0"/>
-              <a:t>9/7/19</a:t>
+              <a:t>9/8/19</a:t>
             </a:fld>
             <a:endParaRPr lang="en-US" dirty="0"/>
           </a:p>
@@ -2430,7 +2475,7 @@
           <a:p>
             <a:fld id="{9796027F-7875-4030-9381-8BD8C4F21935}" type="datetimeFigureOut">
               <a:rPr lang="en-US" smtClean="0"/>
-              <a:t>9/7/19</a:t>
+              <a:t>9/8/19</a:t>
             </a:fld>
             <a:endParaRPr lang="en-US" dirty="0"/>
           </a:p>
@@ -2548,7 +2593,7 @@
           <a:p>
             <a:fld id="{4509A250-FF31-4206-8172-F9D3106AACB1}" type="datetimeFigureOut">
               <a:rPr lang="en-US" smtClean="0"/>
-              <a:t>9/7/19</a:t>
+              <a:t>9/8/19</a:t>
             </a:fld>
             <a:endParaRPr lang="en-US" dirty="0"/>
           </a:p>
@@ -2643,7 +2688,7 @@
           <a:p>
             <a:fld id="{4509A250-FF31-4206-8172-F9D3106AACB1}" type="datetimeFigureOut">
               <a:rPr lang="en-US" smtClean="0"/>
-              <a:t>9/7/19</a:t>
+              <a:t>9/8/19</a:t>
             </a:fld>
             <a:endParaRPr lang="en-US" dirty="0"/>
           </a:p>
@@ -2920,7 +2965,7 @@
           <a:p>
             <a:fld id="{4509A250-FF31-4206-8172-F9D3106AACB1}" type="datetimeFigureOut">
               <a:rPr lang="en-US" smtClean="0"/>
-              <a:t>9/7/19</a:t>
+              <a:t>9/8/19</a:t>
             </a:fld>
             <a:endParaRPr lang="en-US" dirty="0"/>
           </a:p>
@@ -3177,7 +3222,7 @@
           <a:p>
             <a:fld id="{4509A250-FF31-4206-8172-F9D3106AACB1}" type="datetimeFigureOut">
               <a:rPr lang="en-US" smtClean="0"/>
-              <a:t>9/7/19</a:t>
+              <a:t>9/8/19</a:t>
             </a:fld>
             <a:endParaRPr lang="en-US" dirty="0"/>
           </a:p>
@@ -3390,7 +3435,7 @@
           <a:p>
             <a:fld id="{4AAD347D-5ACD-4C99-B74B-A9C85AD731AF}" type="datetimeFigureOut">
               <a:rPr lang="en-US" smtClean="0"/>
-              <a:t>9/7/19</a:t>
+              <a:t>9/8/19</a:t>
             </a:fld>
             <a:endParaRPr lang="en-US" dirty="0"/>
           </a:p>
@@ -3861,15 +3906,20 @@
             <a:pPr algn="l"/>
             <a:r>
               <a:rPr lang="en-US" sz="2400" b="1" dirty="0"/>
-              <a:t>Basic Syntax </a:t>
+              <a:t>Basic Datatypes </a:t>
             </a:r>
           </a:p>
           <a:p>
             <a:pPr algn="l"/>
             <a:r>
               <a:rPr lang="en-US" sz="2400" b="1" dirty="0"/>
-              <a:t>Datatypes I: Integers, Floats, Booleans</a:t>
-            </a:r>
+              <a:t>Integers, Floats, Booleans, </a:t>
+            </a:r>
+            <a:r>
+              <a:rPr lang="en-US" sz="2400" b="1" dirty="0" err="1"/>
+              <a:t>NoneType</a:t>
+            </a:r>
+            <a:endParaRPr lang="en-US" sz="2400" b="1" dirty="0"/>
           </a:p>
         </p:txBody>
       </p:sp>
@@ -11554,6 +11604,21 @@
               <a:buFont typeface="+mj-lt"/>
               <a:buAutoNum type="alphaLcParenR"/>
             </a:pPr>
+            <a:r>
+              <a:rPr lang="en-US" dirty="0" err="1">
+                <a:latin typeface="Gill Sans MT" panose="020B0502020104020203" pitchFamily="34" charset="77"/>
+              </a:rPr>
+              <a:t>NoneType</a:t>
+            </a:r>
+            <a:endParaRPr lang="en-US" dirty="0">
+              <a:latin typeface="Gill Sans MT" panose="020B0502020104020203" pitchFamily="34" charset="77"/>
+            </a:endParaRPr>
+          </a:p>
+          <a:p>
+            <a:pPr marL="800100" lvl="1" indent="-457200">
+              <a:buFont typeface="+mj-lt"/>
+              <a:buAutoNum type="alphaLcParenR"/>
+            </a:pPr>
             <a:endParaRPr lang="en-US" dirty="0">
               <a:latin typeface="Gill Sans MT" panose="020B0502020104020203" pitchFamily="34" charset="77"/>
             </a:endParaRPr>
@@ -11847,6 +11912,37 @@
                                           <p:spTgt spid="9">
                                             <p:txEl>
                                               <p:pRg st="8" end="8"/>
+                                            </p:txEl>
+                                          </p:spTgt>
+                                        </p:tgtEl>
+                                        <p:attrNameLst>
+                                          <p:attrName>style.visibility</p:attrName>
+                                        </p:attrNameLst>
+                                      </p:cBhvr>
+                                      <p:to>
+                                        <p:strVal val="visible"/>
+                                      </p:to>
+                                    </p:set>
+                                  </p:childTnLst>
+                                </p:cTn>
+                              </p:par>
+                              <p:par>
+                                <p:cTn id="21" presetID="1" presetClass="entr" presetSubtype="0" fill="hold" nodeType="withEffect">
+                                  <p:stCondLst>
+                                    <p:cond delay="0"/>
+                                  </p:stCondLst>
+                                  <p:childTnLst>
+                                    <p:set>
+                                      <p:cBhvr>
+                                        <p:cTn id="22" dur="1" fill="hold">
+                                          <p:stCondLst>
+                                            <p:cond delay="0"/>
+                                          </p:stCondLst>
+                                        </p:cTn>
+                                        <p:tgtEl>
+                                          <p:spTgt spid="9">
+                                            <p:txEl>
+                                              <p:pRg st="9" end="9"/>
                                             </p:txEl>
                                           </p:spTgt>
                                         </p:tgtEl>
@@ -12772,7 +12868,7 @@
           <a:p>
             <a:r>
               <a:rPr lang="en-US" dirty="0"/>
-              <a:t>Boolean Type</a:t>
+              <a:t>Casting</a:t>
             </a:r>
           </a:p>
         </p:txBody>
@@ -12795,13 +12891,13 @@
         </p:nvSpPr>
         <p:spPr>
           <a:xfrm>
-            <a:off x="483848" y="1150913"/>
-            <a:ext cx="8051725" cy="4440590"/>
+            <a:off x="483848" y="1288073"/>
+            <a:ext cx="8051725" cy="4292919"/>
           </a:xfrm>
         </p:spPr>
         <p:txBody>
           <a:bodyPr>
-            <a:noAutofit/>
+            <a:normAutofit/>
           </a:bodyPr>
           <a:lstStyle/>
           <a:p>
@@ -12809,220 +12905,17 @@
               <a:buNone/>
             </a:pPr>
             <a:r>
-              <a:rPr lang="en-US" dirty="0"/>
-              <a:t>The Boolean type is a simple type with two possible values: True and False.</a:t>
-            </a:r>
-          </a:p>
-          <a:p>
-            <a:pPr marL="0" indent="0">
-              <a:buNone/>
-            </a:pPr>
-            <a:r>
-              <a:rPr lang="en-US" dirty="0"/>
-              <a:t>Boolean values are case-sensitive: unlike some other languages, True and False must be capitalized! </a:t>
-            </a:r>
-          </a:p>
-          <a:p>
-            <a:pPr marL="0" indent="0">
-              <a:buNone/>
-            </a:pPr>
-            <a:endParaRPr lang="en-US" dirty="0"/>
-          </a:p>
-          <a:p>
-            <a:pPr marL="0" indent="0">
-              <a:buNone/>
-            </a:pPr>
-            <a:r>
-              <a:rPr lang="en-US" dirty="0"/>
-              <a:t>Comparison operators return </a:t>
-            </a:r>
-          </a:p>
-          <a:p>
-            <a:pPr marL="0" indent="0">
-              <a:buNone/>
-            </a:pPr>
-            <a:r>
-              <a:rPr lang="en-US" dirty="0"/>
-              <a:t>True or False values. </a:t>
-            </a:r>
-          </a:p>
-          <a:p>
-            <a:pPr marL="0" indent="0">
-              <a:buNone/>
-            </a:pPr>
-            <a:endParaRPr lang="en-US" dirty="0"/>
-          </a:p>
-          <a:p>
-            <a:pPr marL="0" indent="0">
-              <a:buNone/>
-            </a:pPr>
-            <a:endParaRPr lang="en-US" dirty="0"/>
-          </a:p>
-          <a:p>
-            <a:pPr marL="0" indent="0">
-              <a:buNone/>
-            </a:pPr>
-            <a:endParaRPr lang="en-US" dirty="0"/>
-          </a:p>
-          <a:p>
-            <a:pPr marL="0" indent="0">
-              <a:buNone/>
-            </a:pPr>
-            <a:endParaRPr lang="en-US" dirty="0"/>
-          </a:p>
-          <a:p>
-            <a:pPr marL="0" indent="0">
-              <a:buNone/>
-            </a:pPr>
-            <a:endParaRPr lang="en-US" dirty="0"/>
-          </a:p>
-          <a:p>
-            <a:pPr marL="0" indent="0">
-              <a:buNone/>
-            </a:pPr>
-            <a:endParaRPr lang="en-US" sz="1900" b="1" dirty="0">
-              <a:latin typeface="Inconsolata Medium" panose="020B0609030003000000" pitchFamily="49" charset="77"/>
-            </a:endParaRPr>
-          </a:p>
-        </p:txBody>
-      </p:sp>
-      <p:sp>
-        <p:nvSpPr>
-          <p:cNvPr id="3" name="TextBox 2">
-            <a:extLst>
-              <a:ext uri="{FF2B5EF4-FFF2-40B4-BE49-F238E27FC236}">
-                <a16:creationId xmlns:a16="http://schemas.microsoft.com/office/drawing/2014/main" id="{899F54E7-5FE4-EF45-9CE3-B2C76F14DE7B}"/>
-              </a:ext>
-            </a:extLst>
-          </p:cNvPr>
-          <p:cNvSpPr txBox="1"/>
-          <p:nvPr/>
-        </p:nvSpPr>
-        <p:spPr>
-          <a:xfrm>
-            <a:off x="4466590" y="3029770"/>
-            <a:ext cx="3880993" cy="2354491"/>
-          </a:xfrm>
-          <a:prstGeom prst="rect">
-            <a:avLst/>
-          </a:prstGeom>
-          <a:noFill/>
-        </p:spPr>
-        <p:txBody>
-          <a:bodyPr wrap="square" rtlCol="0">
-            <a:spAutoFit/>
-          </a:bodyPr>
-          <a:lstStyle/>
-          <a:p>
-            <a:r>
-              <a:rPr lang="en-US" sz="2100" b="1" dirty="0">
-                <a:solidFill>
-                  <a:srgbClr val="000087"/>
-                </a:solidFill>
-                <a:latin typeface="Inconsolata Medium" panose="020B0609030003000000" pitchFamily="49" charset="77"/>
-              </a:rPr>
-              <a:t>In </a:t>
-            </a:r>
-            <a:r>
-              <a:rPr lang="en-US" sz="2100" b="1" dirty="0">
-                <a:latin typeface="Inconsolata Medium" panose="020B0609030003000000" pitchFamily="49" charset="77"/>
-              </a:rPr>
-              <a:t>[</a:t>
-            </a:r>
-            <a:r>
-              <a:rPr lang="en-US" sz="2100" b="1" dirty="0">
-                <a:solidFill>
-                  <a:srgbClr val="FF6600"/>
-                </a:solidFill>
-                <a:latin typeface="Inconsolata Medium" panose="020B0609030003000000" pitchFamily="49" charset="77"/>
-              </a:rPr>
-              <a:t>2</a:t>
-            </a:r>
-            <a:r>
-              <a:rPr lang="en-US" sz="2100" b="1" dirty="0">
-                <a:latin typeface="Inconsolata Medium" panose="020B0609030003000000" pitchFamily="49" charset="77"/>
-              </a:rPr>
-              <a:t>]: </a:t>
-            </a:r>
-            <a:r>
-              <a:rPr lang="en-US" sz="2100" b="1" dirty="0">
-                <a:solidFill>
-                  <a:srgbClr val="000087"/>
-                </a:solidFill>
-                <a:latin typeface="Inconsolata Medium" panose="020B0609030003000000" pitchFamily="49" charset="77"/>
-              </a:rPr>
-              <a:t>result </a:t>
-            </a:r>
-            <a:r>
-              <a:rPr lang="en-US" sz="2100" b="1" dirty="0">
-                <a:solidFill>
-                  <a:srgbClr val="545454"/>
-                </a:solidFill>
-                <a:latin typeface="Inconsolata Medium" panose="020B0609030003000000" pitchFamily="49" charset="77"/>
-              </a:rPr>
-              <a:t>= </a:t>
-            </a:r>
-            <a:r>
-              <a:rPr lang="en-US" sz="2100" b="1" dirty="0">
-                <a:latin typeface="Inconsolata Medium" panose="020B0609030003000000" pitchFamily="49" charset="77"/>
-              </a:rPr>
-              <a:t>(</a:t>
-            </a:r>
-            <a:r>
-              <a:rPr lang="en-US" sz="2100" b="1" dirty="0">
-                <a:solidFill>
-                  <a:srgbClr val="FF6600"/>
-                </a:solidFill>
-                <a:latin typeface="Inconsolata Medium" panose="020B0609030003000000" pitchFamily="49" charset="77"/>
-              </a:rPr>
-              <a:t>4 </a:t>
-            </a:r>
-            <a:r>
-              <a:rPr lang="en-US" sz="2100" b="1" dirty="0">
-                <a:solidFill>
-                  <a:srgbClr val="545454"/>
-                </a:solidFill>
-                <a:latin typeface="Inconsolata Medium" panose="020B0609030003000000" pitchFamily="49" charset="77"/>
-              </a:rPr>
-              <a:t>&lt; </a:t>
-            </a:r>
-            <a:r>
-              <a:rPr lang="en-US" sz="2100" b="1" dirty="0">
-                <a:solidFill>
-                  <a:srgbClr val="FF6600"/>
-                </a:solidFill>
-                <a:latin typeface="Inconsolata Medium" panose="020B0609030003000000" pitchFamily="49" charset="77"/>
-              </a:rPr>
-              <a:t>5</a:t>
-            </a:r>
-            <a:r>
-              <a:rPr lang="en-US" sz="2100" b="1" dirty="0">
-                <a:latin typeface="Inconsolata Medium" panose="020B0609030003000000" pitchFamily="49" charset="77"/>
-              </a:rPr>
-              <a:t>)</a:t>
-            </a:r>
-          </a:p>
-          <a:p>
-            <a:r>
-              <a:rPr lang="en-US" sz="2100" b="1" dirty="0">
-                <a:solidFill>
-                  <a:srgbClr val="000087"/>
-                </a:solidFill>
-                <a:latin typeface="Inconsolata Medium" panose="020B0609030003000000" pitchFamily="49" charset="77"/>
-              </a:rPr>
-              <a:t>        result </a:t>
-            </a:r>
-          </a:p>
-          <a:p>
-            <a:r>
-              <a:rPr lang="en-US" sz="2100" b="1" dirty="0">
-                <a:latin typeface="Inconsolata Medium" panose="020B0609030003000000" pitchFamily="49" charset="77"/>
-              </a:rPr>
-              <a:t>Out[2]: True </a:t>
-            </a:r>
-          </a:p>
-          <a:p>
-            <a:endParaRPr lang="en-US" sz="2100" b="1" dirty="0">
+              <a:rPr lang="en-US" sz="2000" dirty="0">
+                <a:latin typeface="Gill Sans MT" panose="020B0502020104020203" pitchFamily="34" charset="77"/>
+              </a:rPr>
+              <a:t>The int() and float() functions can be called to cast a value to a integer or float, respectively.</a:t>
+            </a:r>
+          </a:p>
+          <a:p>
+            <a:pPr marL="0" indent="0">
+              <a:buNone/>
+            </a:pPr>
+            <a:endParaRPr lang="en-US" sz="2000" b="1" dirty="0">
               <a:solidFill>
                 <a:srgbClr val="000087"/>
               </a:solidFill>
@@ -13030,8 +12923,11 @@
             </a:endParaRPr>
           </a:p>
           <a:p>
-            <a:r>
-              <a:rPr lang="en-US" sz="2100" b="1" dirty="0">
+            <a:pPr marL="0" indent="0">
+              <a:buNone/>
+            </a:pPr>
+            <a:r>
+              <a:rPr lang="en-US" sz="2000" b="1" dirty="0">
                 <a:solidFill>
                   <a:srgbClr val="000087"/>
                 </a:solidFill>
@@ -13040,13 +12936,13 @@
               <a:t>In</a:t>
             </a:r>
             <a:r>
-              <a:rPr lang="en-US" sz="2100" b="1" dirty="0">
+              <a:rPr lang="en-US" sz="2000" b="1" dirty="0">
                 <a:latin typeface="Inconsolata Medium" panose="020B0609030003000000" pitchFamily="49" charset="77"/>
               </a:rPr>
               <a:t>[</a:t>
             </a:r>
             <a:r>
-              <a:rPr lang="en-US" sz="2100" b="1" dirty="0">
+              <a:rPr lang="en-US" sz="2000" b="1" dirty="0">
                 <a:solidFill>
                   <a:srgbClr val="FF6600"/>
                 </a:solidFill>
@@ -13055,111 +12951,427 @@
               <a:t>3</a:t>
             </a:r>
             <a:r>
-              <a:rPr lang="en-US" sz="2100" b="1" dirty="0">
-                <a:latin typeface="Inconsolata Medium" panose="020B0609030003000000" pitchFamily="49" charset="77"/>
-              </a:rPr>
-              <a:t>]: 3 == 5 </a:t>
-            </a:r>
-          </a:p>
-          <a:p>
-            <a:r>
-              <a:rPr lang="en-US" sz="2100" b="1" dirty="0">
-                <a:latin typeface="Inconsolata Medium" panose="020B0609030003000000" pitchFamily="49" charset="77"/>
-              </a:rPr>
-              <a:t>Out[3]: False </a:t>
-            </a:r>
-          </a:p>
-          <a:p>
-            <a:endParaRPr lang="en-US" sz="2100" b="1" dirty="0">
+              <a:rPr lang="en-US" sz="2000" b="1" dirty="0">
+                <a:latin typeface="Inconsolata Medium" panose="020B0609030003000000" pitchFamily="49" charset="77"/>
+              </a:rPr>
+              <a:t>]: </a:t>
+            </a:r>
+            <a:r>
+              <a:rPr lang="en-US" sz="2000" b="1" dirty="0">
+                <a:solidFill>
+                  <a:srgbClr val="000000"/>
+                </a:solidFill>
+                <a:latin typeface="Inconsolata Medium" panose="020B0609030003000000" pitchFamily="49" charset="77"/>
+              </a:rPr>
+              <a:t>x = </a:t>
+            </a:r>
+            <a:r>
+              <a:rPr lang="en-US" sz="2000" b="1" dirty="0">
+                <a:solidFill>
+                  <a:srgbClr val="0000CD"/>
+                </a:solidFill>
+                <a:latin typeface="Inconsolata Medium" panose="020B0609030003000000" pitchFamily="49" charset="77"/>
+              </a:rPr>
+              <a:t>int</a:t>
+            </a:r>
+            <a:r>
+              <a:rPr lang="en-US" sz="2000" b="1" dirty="0">
+                <a:solidFill>
+                  <a:srgbClr val="000000"/>
+                </a:solidFill>
+                <a:latin typeface="Inconsolata Medium" panose="020B0609030003000000" pitchFamily="49" charset="77"/>
+              </a:rPr>
+              <a:t>(</a:t>
+            </a:r>
+            <a:r>
+              <a:rPr lang="en-US" sz="2000" b="1" dirty="0">
+                <a:solidFill>
+                  <a:srgbClr val="FF0000"/>
+                </a:solidFill>
+                <a:latin typeface="Inconsolata Medium" panose="020B0609030003000000" pitchFamily="49" charset="77"/>
+              </a:rPr>
+              <a:t>1</a:t>
+            </a:r>
+            <a:r>
+              <a:rPr lang="en-US" sz="2000" b="1" dirty="0">
+                <a:solidFill>
+                  <a:srgbClr val="000000"/>
+                </a:solidFill>
+                <a:latin typeface="Inconsolata Medium" panose="020B0609030003000000" pitchFamily="49" charset="77"/>
+              </a:rPr>
+              <a:t>)   </a:t>
+            </a:r>
+            <a:r>
+              <a:rPr lang="en-US" sz="2000" b="1" dirty="0">
+                <a:solidFill>
+                  <a:srgbClr val="008000"/>
+                </a:solidFill>
+                <a:latin typeface="Inconsolata Medium" panose="020B0609030003000000" pitchFamily="49" charset="77"/>
+              </a:rPr>
+              <a:t># x will be 1</a:t>
+            </a:r>
+          </a:p>
+          <a:p>
+            <a:pPr marL="0" indent="0">
+              <a:buNone/>
+            </a:pPr>
+            <a:r>
+              <a:rPr lang="en-US" sz="2000" b="1" dirty="0">
+                <a:solidFill>
+                  <a:srgbClr val="008000"/>
+                </a:solidFill>
+                <a:latin typeface="Inconsolata Medium" panose="020B0609030003000000" pitchFamily="49" charset="77"/>
+              </a:rPr>
+              <a:t>       </a:t>
+            </a:r>
+            <a:r>
+              <a:rPr lang="en-US" sz="2000" b="1" dirty="0">
+                <a:solidFill>
+                  <a:srgbClr val="000000"/>
+                </a:solidFill>
+                <a:latin typeface="Inconsolata Medium" panose="020B0609030003000000" pitchFamily="49" charset="77"/>
+              </a:rPr>
+              <a:t>y = </a:t>
+            </a:r>
+            <a:r>
+              <a:rPr lang="en-US" sz="2000" b="1" dirty="0">
+                <a:solidFill>
+                  <a:srgbClr val="0000CD"/>
+                </a:solidFill>
+                <a:latin typeface="Inconsolata Medium" panose="020B0609030003000000" pitchFamily="49" charset="77"/>
+              </a:rPr>
+              <a:t>int</a:t>
+            </a:r>
+            <a:r>
+              <a:rPr lang="en-US" sz="2000" b="1" dirty="0">
+                <a:solidFill>
+                  <a:srgbClr val="000000"/>
+                </a:solidFill>
+                <a:latin typeface="Inconsolata Medium" panose="020B0609030003000000" pitchFamily="49" charset="77"/>
+              </a:rPr>
+              <a:t>(</a:t>
+            </a:r>
+            <a:r>
+              <a:rPr lang="en-US" sz="2000" b="1" dirty="0">
+                <a:solidFill>
+                  <a:srgbClr val="FF0000"/>
+                </a:solidFill>
+                <a:latin typeface="Inconsolata Medium" panose="020B0609030003000000" pitchFamily="49" charset="77"/>
+              </a:rPr>
+              <a:t>2.8</a:t>
+            </a:r>
+            <a:r>
+              <a:rPr lang="en-US" sz="2000" b="1" dirty="0">
+                <a:solidFill>
+                  <a:srgbClr val="000000"/>
+                </a:solidFill>
+                <a:latin typeface="Inconsolata Medium" panose="020B0609030003000000" pitchFamily="49" charset="77"/>
+              </a:rPr>
+              <a:t>) </a:t>
+            </a:r>
+            <a:r>
+              <a:rPr lang="en-US" sz="2000" b="1" dirty="0">
+                <a:solidFill>
+                  <a:srgbClr val="008000"/>
+                </a:solidFill>
+                <a:latin typeface="Inconsolata Medium" panose="020B0609030003000000" pitchFamily="49" charset="77"/>
+              </a:rPr>
+              <a:t># y will be 2</a:t>
+            </a:r>
+            <a:br>
+              <a:rPr lang="en-US" sz="2000" b="1" dirty="0">
+                <a:solidFill>
+                  <a:srgbClr val="008000"/>
+                </a:solidFill>
+                <a:latin typeface="Inconsolata Medium" panose="020B0609030003000000" pitchFamily="49" charset="77"/>
+              </a:rPr>
+            </a:br>
+            <a:r>
+              <a:rPr lang="en-US" sz="2000" b="1" dirty="0">
+                <a:solidFill>
+                  <a:srgbClr val="008000"/>
+                </a:solidFill>
+                <a:latin typeface="Inconsolata Medium" panose="020B0609030003000000" pitchFamily="49" charset="77"/>
+              </a:rPr>
+              <a:t>       </a:t>
+            </a:r>
+            <a:r>
+              <a:rPr lang="en-US" sz="2000" b="1" dirty="0">
+                <a:solidFill>
+                  <a:srgbClr val="000000"/>
+                </a:solidFill>
+                <a:latin typeface="Inconsolata Medium" panose="020B0609030003000000" pitchFamily="49" charset="77"/>
+              </a:rPr>
+              <a:t>z = </a:t>
+            </a:r>
+            <a:r>
+              <a:rPr lang="en-US" sz="2000" b="1" dirty="0">
+                <a:solidFill>
+                  <a:srgbClr val="0000CD"/>
+                </a:solidFill>
+                <a:latin typeface="Inconsolata Medium" panose="020B0609030003000000" pitchFamily="49" charset="77"/>
+              </a:rPr>
+              <a:t>int</a:t>
+            </a:r>
+            <a:r>
+              <a:rPr lang="en-US" sz="2000" b="1" dirty="0">
+                <a:solidFill>
+                  <a:srgbClr val="000000"/>
+                </a:solidFill>
+                <a:latin typeface="Inconsolata Medium" panose="020B0609030003000000" pitchFamily="49" charset="77"/>
+              </a:rPr>
+              <a:t>(</a:t>
+            </a:r>
+            <a:r>
+              <a:rPr lang="en-US" sz="2000" b="1" dirty="0">
+                <a:solidFill>
+                  <a:srgbClr val="A52A2A"/>
+                </a:solidFill>
+                <a:latin typeface="Inconsolata Medium" panose="020B0609030003000000" pitchFamily="49" charset="77"/>
+              </a:rPr>
+              <a:t>‘3’</a:t>
+            </a:r>
+            <a:r>
+              <a:rPr lang="en-US" sz="2000" b="1" dirty="0">
+                <a:solidFill>
+                  <a:srgbClr val="000000"/>
+                </a:solidFill>
+                <a:latin typeface="Inconsolata Medium" panose="020B0609030003000000" pitchFamily="49" charset="77"/>
+              </a:rPr>
+              <a:t>) </a:t>
+            </a:r>
+            <a:r>
+              <a:rPr lang="en-US" sz="2000" b="1" dirty="0">
+                <a:solidFill>
+                  <a:srgbClr val="008000"/>
+                </a:solidFill>
+                <a:latin typeface="Inconsolata Medium" panose="020B0609030003000000" pitchFamily="49" charset="77"/>
+              </a:rPr>
+              <a:t># z will be 3</a:t>
+            </a:r>
+            <a:br>
+              <a:rPr lang="en-US" sz="2000" b="1" dirty="0">
+                <a:solidFill>
+                  <a:srgbClr val="008000"/>
+                </a:solidFill>
+                <a:latin typeface="Inconsolata Medium" panose="020B0609030003000000" pitchFamily="49" charset="77"/>
+              </a:rPr>
+            </a:br>
+            <a:r>
+              <a:rPr lang="en-US" sz="2000" b="1" dirty="0">
+                <a:solidFill>
+                  <a:srgbClr val="008000"/>
+                </a:solidFill>
+                <a:latin typeface="Inconsolata Medium" panose="020B0609030003000000" pitchFamily="49" charset="77"/>
+              </a:rPr>
+              <a:t>       </a:t>
+            </a:r>
+            <a:r>
+              <a:rPr lang="en-US" sz="2000" b="1" dirty="0">
+                <a:solidFill>
+                  <a:srgbClr val="000000"/>
+                </a:solidFill>
+                <a:latin typeface="Inconsolata Medium" panose="020B0609030003000000" pitchFamily="49" charset="77"/>
+              </a:rPr>
+              <a:t>a = </a:t>
+            </a:r>
+            <a:r>
+              <a:rPr lang="en-US" sz="2000" b="1" dirty="0">
+                <a:solidFill>
+                  <a:srgbClr val="0000CD"/>
+                </a:solidFill>
+                <a:latin typeface="Inconsolata Medium" panose="020B0609030003000000" pitchFamily="49" charset="77"/>
+              </a:rPr>
+              <a:t>float</a:t>
+            </a:r>
+            <a:r>
+              <a:rPr lang="en-US" sz="2000" b="1" dirty="0">
+                <a:solidFill>
+                  <a:srgbClr val="000000"/>
+                </a:solidFill>
+                <a:latin typeface="Inconsolata Medium" panose="020B0609030003000000" pitchFamily="49" charset="77"/>
+              </a:rPr>
+              <a:t>(</a:t>
+            </a:r>
+            <a:r>
+              <a:rPr lang="en-US" sz="2000" b="1" dirty="0">
+                <a:solidFill>
+                  <a:srgbClr val="FF0000"/>
+                </a:solidFill>
+                <a:latin typeface="Inconsolata Medium" panose="020B0609030003000000" pitchFamily="49" charset="77"/>
+              </a:rPr>
+              <a:t>2.8</a:t>
+            </a:r>
+            <a:r>
+              <a:rPr lang="en-US" sz="2000" b="1" dirty="0">
+                <a:solidFill>
+                  <a:srgbClr val="000000"/>
+                </a:solidFill>
+                <a:latin typeface="Inconsolata Medium" panose="020B0609030003000000" pitchFamily="49" charset="77"/>
+              </a:rPr>
+              <a:t>)   </a:t>
+            </a:r>
+            <a:r>
+              <a:rPr lang="en-US" sz="2000" b="1" dirty="0">
+                <a:solidFill>
+                  <a:srgbClr val="008000"/>
+                </a:solidFill>
+                <a:latin typeface="Inconsolata Medium" panose="020B0609030003000000" pitchFamily="49" charset="77"/>
+              </a:rPr>
+              <a:t># a will be 2.8</a:t>
+            </a:r>
+            <a:br>
+              <a:rPr lang="en-US" sz="2000" b="1" dirty="0">
+                <a:solidFill>
+                  <a:srgbClr val="008000"/>
+                </a:solidFill>
+                <a:latin typeface="Inconsolata Medium" panose="020B0609030003000000" pitchFamily="49" charset="77"/>
+              </a:rPr>
+            </a:br>
+            <a:r>
+              <a:rPr lang="en-US" sz="2000" b="1" dirty="0">
+                <a:solidFill>
+                  <a:srgbClr val="008000"/>
+                </a:solidFill>
+                <a:latin typeface="Inconsolata Medium" panose="020B0609030003000000" pitchFamily="49" charset="77"/>
+              </a:rPr>
+              <a:t>       </a:t>
+            </a:r>
+            <a:r>
+              <a:rPr lang="en-US" sz="2000" b="1" dirty="0">
+                <a:solidFill>
+                  <a:srgbClr val="000000"/>
+                </a:solidFill>
+                <a:latin typeface="Inconsolata Medium" panose="020B0609030003000000" pitchFamily="49" charset="77"/>
+              </a:rPr>
+              <a:t>b = </a:t>
+            </a:r>
+            <a:r>
+              <a:rPr lang="en-US" sz="2000" b="1" dirty="0">
+                <a:solidFill>
+                  <a:srgbClr val="0000CD"/>
+                </a:solidFill>
+                <a:latin typeface="Inconsolata Medium" panose="020B0609030003000000" pitchFamily="49" charset="77"/>
+              </a:rPr>
+              <a:t>float</a:t>
+            </a:r>
+            <a:r>
+              <a:rPr lang="en-US" sz="2000" b="1" dirty="0">
+                <a:solidFill>
+                  <a:srgbClr val="000000"/>
+                </a:solidFill>
+                <a:latin typeface="Inconsolata Medium" panose="020B0609030003000000" pitchFamily="49" charset="77"/>
+              </a:rPr>
+              <a:t>(</a:t>
+            </a:r>
+            <a:r>
+              <a:rPr lang="en-US" sz="2000" b="1" dirty="0">
+                <a:solidFill>
+                  <a:srgbClr val="A52A2A"/>
+                </a:solidFill>
+                <a:latin typeface="Inconsolata Medium" panose="020B0609030003000000" pitchFamily="49" charset="77"/>
+              </a:rPr>
+              <a:t>“3”</a:t>
+            </a:r>
+            <a:r>
+              <a:rPr lang="en-US" sz="2000" b="1" dirty="0">
+                <a:solidFill>
+                  <a:srgbClr val="000000"/>
+                </a:solidFill>
+                <a:latin typeface="Inconsolata Medium" panose="020B0609030003000000" pitchFamily="49" charset="77"/>
+              </a:rPr>
+              <a:t>)   </a:t>
+            </a:r>
+            <a:r>
+              <a:rPr lang="en-US" sz="2000" b="1" dirty="0">
+                <a:solidFill>
+                  <a:srgbClr val="008000"/>
+                </a:solidFill>
+                <a:latin typeface="Inconsolata Medium" panose="020B0609030003000000" pitchFamily="49" charset="77"/>
+              </a:rPr>
+              <a:t># b will be 3.0</a:t>
+            </a:r>
+            <a:br>
+              <a:rPr lang="en-US" sz="2000" b="1" dirty="0">
+                <a:solidFill>
+                  <a:srgbClr val="008000"/>
+                </a:solidFill>
+                <a:latin typeface="Inconsolata Medium" panose="020B0609030003000000" pitchFamily="49" charset="77"/>
+              </a:rPr>
+            </a:br>
+            <a:r>
+              <a:rPr lang="en-US" sz="2000" b="1" dirty="0">
+                <a:solidFill>
+                  <a:srgbClr val="008000"/>
+                </a:solidFill>
+                <a:latin typeface="Inconsolata Medium" panose="020B0609030003000000" pitchFamily="49" charset="77"/>
+              </a:rPr>
+              <a:t>       </a:t>
+            </a:r>
+            <a:r>
+              <a:rPr lang="en-US" sz="2000" b="1" dirty="0">
+                <a:solidFill>
+                  <a:srgbClr val="000000"/>
+                </a:solidFill>
+                <a:latin typeface="Inconsolata Medium" panose="020B0609030003000000" pitchFamily="49" charset="77"/>
+              </a:rPr>
+              <a:t>c = </a:t>
+            </a:r>
+            <a:r>
+              <a:rPr lang="en-US" sz="2000" b="1" dirty="0">
+                <a:solidFill>
+                  <a:srgbClr val="0000CD"/>
+                </a:solidFill>
+                <a:latin typeface="Inconsolata Medium" panose="020B0609030003000000" pitchFamily="49" charset="77"/>
+              </a:rPr>
+              <a:t>float</a:t>
+            </a:r>
+            <a:r>
+              <a:rPr lang="en-US" sz="2000" b="1" dirty="0">
+                <a:solidFill>
+                  <a:srgbClr val="000000"/>
+                </a:solidFill>
+                <a:latin typeface="Inconsolata Medium" panose="020B0609030003000000" pitchFamily="49" charset="77"/>
+              </a:rPr>
+              <a:t>(</a:t>
+            </a:r>
+            <a:r>
+              <a:rPr lang="en-US" sz="2000" b="1" dirty="0">
+                <a:solidFill>
+                  <a:srgbClr val="A52A2A"/>
+                </a:solidFill>
+                <a:latin typeface="Inconsolata Medium" panose="020B0609030003000000" pitchFamily="49" charset="77"/>
+              </a:rPr>
+              <a:t>‘4.2’</a:t>
+            </a:r>
+            <a:r>
+              <a:rPr lang="en-US" sz="2000" b="1" dirty="0">
+                <a:solidFill>
+                  <a:srgbClr val="000000"/>
+                </a:solidFill>
+                <a:latin typeface="Inconsolata Medium" panose="020B0609030003000000" pitchFamily="49" charset="77"/>
+              </a:rPr>
+              <a:t>) </a:t>
+            </a:r>
+            <a:r>
+              <a:rPr lang="en-US" sz="2000" b="1" dirty="0">
+                <a:solidFill>
+                  <a:srgbClr val="008000"/>
+                </a:solidFill>
+                <a:latin typeface="Inconsolata Medium" panose="020B0609030003000000" pitchFamily="49" charset="77"/>
+              </a:rPr>
+              <a:t># c will be 4.2</a:t>
+            </a:r>
+            <a:endParaRPr lang="en-US" sz="2000" b="1" dirty="0">
               <a:latin typeface="Inconsolata Medium" panose="020B0609030003000000" pitchFamily="49" charset="77"/>
             </a:endParaRPr>
-          </a:p>
-        </p:txBody>
-      </p:sp>
-      <p:sp>
-        <p:nvSpPr>
-          <p:cNvPr id="5" name="TextBox 4">
-            <a:extLst>
-              <a:ext uri="{FF2B5EF4-FFF2-40B4-BE49-F238E27FC236}">
-                <a16:creationId xmlns:a16="http://schemas.microsoft.com/office/drawing/2014/main" id="{A837F494-BE4D-5645-A5EE-61E70636208A}"/>
-              </a:ext>
-            </a:extLst>
-          </p:cNvPr>
-          <p:cNvSpPr txBox="1"/>
-          <p:nvPr/>
-        </p:nvSpPr>
-        <p:spPr>
-          <a:xfrm>
-            <a:off x="483848" y="3878826"/>
-            <a:ext cx="3365327" cy="1061829"/>
-          </a:xfrm>
-          <a:prstGeom prst="rect">
-            <a:avLst/>
-          </a:prstGeom>
-          <a:noFill/>
-        </p:spPr>
-        <p:txBody>
-          <a:bodyPr wrap="square" rtlCol="0">
-            <a:spAutoFit/>
-          </a:bodyPr>
-          <a:lstStyle/>
-          <a:p>
-            <a:r>
-              <a:rPr lang="en-US" sz="2100" b="1" dirty="0">
-                <a:solidFill>
-                  <a:srgbClr val="000087"/>
-                </a:solidFill>
-                <a:latin typeface="Inconsolata Medium" panose="020B0609030003000000" pitchFamily="49" charset="77"/>
-              </a:rPr>
-              <a:t>In</a:t>
-            </a:r>
-            <a:r>
-              <a:rPr lang="en-US" sz="2100" b="1" dirty="0">
-                <a:latin typeface="Inconsolata Medium" panose="020B0609030003000000" pitchFamily="49" charset="77"/>
-              </a:rPr>
-              <a:t>[</a:t>
-            </a:r>
-            <a:r>
-              <a:rPr lang="en-US" sz="2100" b="1" dirty="0">
-                <a:solidFill>
-                  <a:srgbClr val="FF6600"/>
-                </a:solidFill>
-                <a:latin typeface="Inconsolata Medium" panose="020B0609030003000000" pitchFamily="49" charset="77"/>
-              </a:rPr>
-              <a:t>1</a:t>
-            </a:r>
-            <a:r>
-              <a:rPr lang="en-US" sz="2100" b="1" dirty="0">
-                <a:latin typeface="Inconsolata Medium" panose="020B0609030003000000" pitchFamily="49" charset="77"/>
-              </a:rPr>
-              <a:t>]: x = False</a:t>
-            </a:r>
-          </a:p>
-          <a:p>
-            <a:r>
-              <a:rPr lang="en-US" sz="2100" b="1" dirty="0">
-                <a:solidFill>
-                  <a:srgbClr val="000087"/>
-                </a:solidFill>
-                <a:latin typeface="Inconsolata Medium" panose="020B0609030003000000" pitchFamily="49" charset="77"/>
-              </a:rPr>
-              <a:t>       type(x) </a:t>
-            </a:r>
-          </a:p>
-          <a:p>
-            <a:r>
-              <a:rPr lang="en-US" sz="2100" b="1" dirty="0">
-                <a:latin typeface="Inconsolata Medium" panose="020B0609030003000000" pitchFamily="49" charset="77"/>
-              </a:rPr>
-              <a:t>Out[1]: bool </a:t>
-            </a:r>
           </a:p>
         </p:txBody>
       </p:sp>
     </p:spTree>
     <p:extLst>
       <p:ext uri="{BB962C8B-B14F-4D97-AF65-F5344CB8AC3E}">
-        <p14:creationId xmlns:p14="http://schemas.microsoft.com/office/powerpoint/2010/main" val="2119170476"/>
+        <p14:creationId xmlns:p14="http://schemas.microsoft.com/office/powerpoint/2010/main" val="3711861066"/>
       </p:ext>
     </p:extLst>
   </p:cSld>
@@ -13214,7 +13426,7 @@
           <a:p>
             <a:r>
               <a:rPr lang="en-US" dirty="0"/>
-              <a:t>Lab 1</a:t>
+              <a:t>Boolean Type</a:t>
             </a:r>
           </a:p>
         </p:txBody>
@@ -13237,8 +13449,8 @@
         </p:nvSpPr>
         <p:spPr>
           <a:xfrm>
-            <a:off x="483848" y="1150912"/>
-            <a:ext cx="8051725" cy="4564087"/>
+            <a:off x="483848" y="1150913"/>
+            <a:ext cx="8051725" cy="4440590"/>
           </a:xfrm>
         </p:spPr>
         <p:txBody>
@@ -13252,118 +13464,356 @@
             </a:pPr>
             <a:r>
               <a:rPr lang="en-US" dirty="0"/>
-              <a:t> Download and install Anaconda on your home computer. </a:t>
-            </a:r>
-          </a:p>
-          <a:p>
-            <a:pPr marL="0" indent="0">
-              <a:buNone/>
-            </a:pPr>
-            <a:r>
-              <a:rPr lang="en-US" dirty="0">
-                <a:hlinkClick r:id="rId2"/>
-              </a:rPr>
-              <a:t>https://www.anaconda.com/distribution/</a:t>
-            </a:r>
+              <a:t>The Boolean type is a simple type with two possible values: True and False.</a:t>
+            </a:r>
+          </a:p>
+          <a:p>
+            <a:pPr marL="0" indent="0">
+              <a:buNone/>
+            </a:pPr>
+            <a:r>
+              <a:rPr lang="en-US" dirty="0"/>
+              <a:t>Boolean values are case-sensitive: unlike some other languages, True and False must be capitalized! </a:t>
+            </a:r>
+          </a:p>
+          <a:p>
+            <a:pPr marL="0" indent="0">
+              <a:buNone/>
+            </a:pPr>
             <a:endParaRPr lang="en-US" dirty="0"/>
           </a:p>
           <a:p>
             <a:pPr marL="0" indent="0">
               <a:buNone/>
             </a:pPr>
+            <a:r>
+              <a:rPr lang="en-US" dirty="0"/>
+              <a:t>Comparison operators return </a:t>
+            </a:r>
+          </a:p>
+          <a:p>
+            <a:pPr marL="0" indent="0">
+              <a:buNone/>
+            </a:pPr>
+            <a:r>
+              <a:rPr lang="en-US" dirty="0"/>
+              <a:t>True or False values. </a:t>
+            </a:r>
+          </a:p>
+          <a:p>
+            <a:pPr marL="0" indent="0">
+              <a:buNone/>
+            </a:pPr>
             <a:endParaRPr lang="en-US" dirty="0"/>
           </a:p>
           <a:p>
             <a:pPr marL="0" indent="0">
               <a:buNone/>
             </a:pPr>
-            <a:r>
-              <a:rPr lang="en-US" dirty="0"/>
-              <a:t>On your computer. Open the </a:t>
-            </a:r>
-            <a:r>
-              <a:rPr lang="en-US" dirty="0" err="1"/>
-              <a:t>IPython</a:t>
-            </a:r>
-            <a:r>
-              <a:rPr lang="en-US" dirty="0"/>
-              <a:t> interpreter. Experiment with some of the concepts we learn:</a:t>
-            </a:r>
-          </a:p>
-          <a:p>
-            <a:pPr marL="0" indent="0">
-              <a:buNone/>
-            </a:pPr>
             <a:endParaRPr lang="en-US" dirty="0"/>
           </a:p>
           <a:p>
-            <a:pPr marL="457200" indent="-457200">
-              <a:buAutoNum type="arabicParenR"/>
-            </a:pPr>
-            <a:r>
-              <a:rPr lang="en-US" dirty="0"/>
-              <a:t>Print some strings. Experiment with the “</a:t>
-            </a:r>
-            <a:r>
-              <a:rPr lang="en-US" dirty="0" err="1"/>
-              <a:t>sep</a:t>
-            </a:r>
-            <a:r>
-              <a:rPr lang="en-US" dirty="0"/>
-              <a:t>” and “end” parameters.</a:t>
-            </a:r>
-          </a:p>
-          <a:p>
-            <a:pPr marL="457200" indent="-457200">
-              <a:buAutoNum type="arabicParenR"/>
-            </a:pPr>
-            <a:r>
-              <a:rPr lang="en-US" dirty="0"/>
-              <a:t>Try division vs floor division with integers. </a:t>
-            </a:r>
-          </a:p>
-          <a:p>
-            <a:pPr marL="457200" indent="-457200">
-              <a:buAutoNum type="arabicParenR"/>
-            </a:pPr>
-            <a:r>
-              <a:rPr lang="en-US" dirty="0"/>
-              <a:t>Initialize some floating point variables in both standard decimal notation and in exponential notation.</a:t>
-            </a:r>
-          </a:p>
-          <a:p>
-            <a:pPr marL="457200" indent="-457200">
-              <a:buAutoNum type="arabicParenR"/>
-            </a:pPr>
-            <a:r>
-              <a:rPr lang="en-US" dirty="0"/>
-              <a:t>Experiment with the type() function. </a:t>
-            </a:r>
-          </a:p>
-          <a:p>
-            <a:pPr marL="457200" indent="-457200">
-              <a:buAutoNum type="arabicParenR"/>
+            <a:pPr marL="0" indent="0">
+              <a:buNone/>
             </a:pPr>
             <a:endParaRPr lang="en-US" dirty="0"/>
           </a:p>
           <a:p>
-            <a:pPr marL="457200" indent="-457200">
-              <a:buAutoNum type="arabicParenR"/>
+            <a:pPr marL="0" indent="0">
+              <a:buNone/>
             </a:pPr>
             <a:endParaRPr lang="en-US" dirty="0"/>
           </a:p>
           <a:p>
-            <a:pPr marL="457200" indent="-457200">
-              <a:buAutoNum type="arabicParenR"/>
+            <a:pPr marL="0" indent="0">
+              <a:buNone/>
             </a:pPr>
             <a:endParaRPr lang="en-US" dirty="0"/>
+          </a:p>
+          <a:p>
+            <a:pPr marL="0" indent="0">
+              <a:buNone/>
+            </a:pPr>
+            <a:endParaRPr lang="en-US" sz="1900" b="1" dirty="0">
+              <a:latin typeface="Inconsolata Medium" panose="020B0609030003000000" pitchFamily="49" charset="77"/>
+            </a:endParaRPr>
+          </a:p>
+        </p:txBody>
+      </p:sp>
+      <p:sp>
+        <p:nvSpPr>
+          <p:cNvPr id="3" name="TextBox 2">
+            <a:extLst>
+              <a:ext uri="{FF2B5EF4-FFF2-40B4-BE49-F238E27FC236}">
+                <a16:creationId xmlns:a16="http://schemas.microsoft.com/office/drawing/2014/main" id="{899F54E7-5FE4-EF45-9CE3-B2C76F14DE7B}"/>
+              </a:ext>
+            </a:extLst>
+          </p:cNvPr>
+          <p:cNvSpPr txBox="1"/>
+          <p:nvPr/>
+        </p:nvSpPr>
+        <p:spPr>
+          <a:xfrm>
+            <a:off x="4466590" y="3029770"/>
+            <a:ext cx="3880993" cy="2354491"/>
+          </a:xfrm>
+          <a:prstGeom prst="rect">
+            <a:avLst/>
+          </a:prstGeom>
+          <a:noFill/>
+        </p:spPr>
+        <p:txBody>
+          <a:bodyPr wrap="square" rtlCol="0">
+            <a:spAutoFit/>
+          </a:bodyPr>
+          <a:lstStyle/>
+          <a:p>
+            <a:r>
+              <a:rPr lang="en-US" sz="2100" b="1" dirty="0">
+                <a:solidFill>
+                  <a:srgbClr val="000087"/>
+                </a:solidFill>
+                <a:latin typeface="Inconsolata Medium" panose="020B0609030003000000" pitchFamily="49" charset="77"/>
+              </a:rPr>
+              <a:t>In </a:t>
+            </a:r>
+            <a:r>
+              <a:rPr lang="en-US" sz="2100" b="1" dirty="0">
+                <a:latin typeface="Inconsolata Medium" panose="020B0609030003000000" pitchFamily="49" charset="77"/>
+              </a:rPr>
+              <a:t>[</a:t>
+            </a:r>
+            <a:r>
+              <a:rPr lang="en-US" sz="2100" b="1" dirty="0">
+                <a:solidFill>
+                  <a:srgbClr val="FF6600"/>
+                </a:solidFill>
+                <a:latin typeface="Inconsolata Medium" panose="020B0609030003000000" pitchFamily="49" charset="77"/>
+              </a:rPr>
+              <a:t>2</a:t>
+            </a:r>
+            <a:r>
+              <a:rPr lang="en-US" sz="2100" b="1" dirty="0">
+                <a:latin typeface="Inconsolata Medium" panose="020B0609030003000000" pitchFamily="49" charset="77"/>
+              </a:rPr>
+              <a:t>]: </a:t>
+            </a:r>
+            <a:r>
+              <a:rPr lang="en-US" sz="2100" b="1" dirty="0">
+                <a:solidFill>
+                  <a:srgbClr val="000087"/>
+                </a:solidFill>
+                <a:latin typeface="Inconsolata Medium" panose="020B0609030003000000" pitchFamily="49" charset="77"/>
+              </a:rPr>
+              <a:t>result </a:t>
+            </a:r>
+            <a:r>
+              <a:rPr lang="en-US" sz="2100" b="1" dirty="0">
+                <a:solidFill>
+                  <a:srgbClr val="545454"/>
+                </a:solidFill>
+                <a:latin typeface="Inconsolata Medium" panose="020B0609030003000000" pitchFamily="49" charset="77"/>
+              </a:rPr>
+              <a:t>= </a:t>
+            </a:r>
+            <a:r>
+              <a:rPr lang="en-US" sz="2100" b="1" dirty="0">
+                <a:latin typeface="Inconsolata Medium" panose="020B0609030003000000" pitchFamily="49" charset="77"/>
+              </a:rPr>
+              <a:t>(</a:t>
+            </a:r>
+            <a:r>
+              <a:rPr lang="en-US" sz="2100" b="1" dirty="0">
+                <a:solidFill>
+                  <a:srgbClr val="FF6600"/>
+                </a:solidFill>
+                <a:latin typeface="Inconsolata Medium" panose="020B0609030003000000" pitchFamily="49" charset="77"/>
+              </a:rPr>
+              <a:t>4 </a:t>
+            </a:r>
+            <a:r>
+              <a:rPr lang="en-US" sz="2100" b="1" dirty="0">
+                <a:solidFill>
+                  <a:srgbClr val="545454"/>
+                </a:solidFill>
+                <a:latin typeface="Inconsolata Medium" panose="020B0609030003000000" pitchFamily="49" charset="77"/>
+              </a:rPr>
+              <a:t>&lt; </a:t>
+            </a:r>
+            <a:r>
+              <a:rPr lang="en-US" sz="2100" b="1" dirty="0">
+                <a:solidFill>
+                  <a:srgbClr val="FF6600"/>
+                </a:solidFill>
+                <a:latin typeface="Inconsolata Medium" panose="020B0609030003000000" pitchFamily="49" charset="77"/>
+              </a:rPr>
+              <a:t>5</a:t>
+            </a:r>
+            <a:r>
+              <a:rPr lang="en-US" sz="2100" b="1" dirty="0">
+                <a:latin typeface="Inconsolata Medium" panose="020B0609030003000000" pitchFamily="49" charset="77"/>
+              </a:rPr>
+              <a:t>)</a:t>
+            </a:r>
+          </a:p>
+          <a:p>
+            <a:r>
+              <a:rPr lang="en-US" sz="2100" b="1" dirty="0">
+                <a:solidFill>
+                  <a:srgbClr val="000087"/>
+                </a:solidFill>
+                <a:latin typeface="Inconsolata Medium" panose="020B0609030003000000" pitchFamily="49" charset="77"/>
+              </a:rPr>
+              <a:t>        result </a:t>
+            </a:r>
+          </a:p>
+          <a:p>
+            <a:r>
+              <a:rPr lang="en-US" sz="2100" b="1" dirty="0">
+                <a:latin typeface="Inconsolata Medium" panose="020B0609030003000000" pitchFamily="49" charset="77"/>
+              </a:rPr>
+              <a:t>Out[2]: True </a:t>
+            </a:r>
+          </a:p>
+          <a:p>
+            <a:endParaRPr lang="en-US" sz="2100" b="1" dirty="0">
+              <a:solidFill>
+                <a:srgbClr val="000087"/>
+              </a:solidFill>
+              <a:latin typeface="Inconsolata Medium" panose="020B0609030003000000" pitchFamily="49" charset="77"/>
+            </a:endParaRPr>
+          </a:p>
+          <a:p>
+            <a:r>
+              <a:rPr lang="en-US" sz="2100" b="1" dirty="0">
+                <a:solidFill>
+                  <a:srgbClr val="000087"/>
+                </a:solidFill>
+                <a:latin typeface="Inconsolata Medium" panose="020B0609030003000000" pitchFamily="49" charset="77"/>
+              </a:rPr>
+              <a:t>In</a:t>
+            </a:r>
+            <a:r>
+              <a:rPr lang="en-US" sz="2100" b="1" dirty="0">
+                <a:latin typeface="Inconsolata Medium" panose="020B0609030003000000" pitchFamily="49" charset="77"/>
+              </a:rPr>
+              <a:t>[</a:t>
+            </a:r>
+            <a:r>
+              <a:rPr lang="en-US" sz="2100" b="1" dirty="0">
+                <a:solidFill>
+                  <a:srgbClr val="FF6600"/>
+                </a:solidFill>
+                <a:latin typeface="Inconsolata Medium" panose="020B0609030003000000" pitchFamily="49" charset="77"/>
+              </a:rPr>
+              <a:t>3</a:t>
+            </a:r>
+            <a:r>
+              <a:rPr lang="en-US" sz="2100" b="1" dirty="0">
+                <a:latin typeface="Inconsolata Medium" panose="020B0609030003000000" pitchFamily="49" charset="77"/>
+              </a:rPr>
+              <a:t>]: 3 == 5 </a:t>
+            </a:r>
+          </a:p>
+          <a:p>
+            <a:r>
+              <a:rPr lang="en-US" sz="2100" b="1" dirty="0">
+                <a:latin typeface="Inconsolata Medium" panose="020B0609030003000000" pitchFamily="49" charset="77"/>
+              </a:rPr>
+              <a:t>Out[3]: False </a:t>
+            </a:r>
+          </a:p>
+          <a:p>
+            <a:endParaRPr lang="en-US" sz="2100" b="1" dirty="0">
+              <a:latin typeface="Inconsolata Medium" panose="020B0609030003000000" pitchFamily="49" charset="77"/>
+            </a:endParaRPr>
+          </a:p>
+        </p:txBody>
+      </p:sp>
+      <p:sp>
+        <p:nvSpPr>
+          <p:cNvPr id="5" name="TextBox 4">
+            <a:extLst>
+              <a:ext uri="{FF2B5EF4-FFF2-40B4-BE49-F238E27FC236}">
+                <a16:creationId xmlns:a16="http://schemas.microsoft.com/office/drawing/2014/main" id="{A837F494-BE4D-5645-A5EE-61E70636208A}"/>
+              </a:ext>
+            </a:extLst>
+          </p:cNvPr>
+          <p:cNvSpPr txBox="1"/>
+          <p:nvPr/>
+        </p:nvSpPr>
+        <p:spPr>
+          <a:xfrm>
+            <a:off x="483848" y="3878826"/>
+            <a:ext cx="3365327" cy="1061829"/>
+          </a:xfrm>
+          <a:prstGeom prst="rect">
+            <a:avLst/>
+          </a:prstGeom>
+          <a:noFill/>
+        </p:spPr>
+        <p:txBody>
+          <a:bodyPr wrap="square" rtlCol="0">
+            <a:spAutoFit/>
+          </a:bodyPr>
+          <a:lstStyle/>
+          <a:p>
+            <a:r>
+              <a:rPr lang="en-US" sz="2100" b="1" dirty="0">
+                <a:solidFill>
+                  <a:srgbClr val="000087"/>
+                </a:solidFill>
+                <a:latin typeface="Inconsolata Medium" panose="020B0609030003000000" pitchFamily="49" charset="77"/>
+              </a:rPr>
+              <a:t>In</a:t>
+            </a:r>
+            <a:r>
+              <a:rPr lang="en-US" sz="2100" b="1" dirty="0">
+                <a:latin typeface="Inconsolata Medium" panose="020B0609030003000000" pitchFamily="49" charset="77"/>
+              </a:rPr>
+              <a:t>[</a:t>
+            </a:r>
+            <a:r>
+              <a:rPr lang="en-US" sz="2100" b="1" dirty="0">
+                <a:solidFill>
+                  <a:srgbClr val="FF6600"/>
+                </a:solidFill>
+                <a:latin typeface="Inconsolata Medium" panose="020B0609030003000000" pitchFamily="49" charset="77"/>
+              </a:rPr>
+              <a:t>1</a:t>
+            </a:r>
+            <a:r>
+              <a:rPr lang="en-US" sz="2100" b="1" dirty="0">
+                <a:latin typeface="Inconsolata Medium" panose="020B0609030003000000" pitchFamily="49" charset="77"/>
+              </a:rPr>
+              <a:t>]: x = False</a:t>
+            </a:r>
+          </a:p>
+          <a:p>
+            <a:r>
+              <a:rPr lang="en-US" sz="2100" b="1" dirty="0">
+                <a:solidFill>
+                  <a:srgbClr val="000087"/>
+                </a:solidFill>
+                <a:latin typeface="Inconsolata Medium" panose="020B0609030003000000" pitchFamily="49" charset="77"/>
+              </a:rPr>
+              <a:t>       type(x) </a:t>
+            </a:r>
+          </a:p>
+          <a:p>
+            <a:r>
+              <a:rPr lang="en-US" sz="2100" b="1" dirty="0">
+                <a:latin typeface="Inconsolata Medium" panose="020B0609030003000000" pitchFamily="49" charset="77"/>
+              </a:rPr>
+              <a:t>Out[1]: bool </a:t>
+            </a:r>
           </a:p>
         </p:txBody>
       </p:sp>
     </p:spTree>
     <p:extLst>
       <p:ext uri="{BB962C8B-B14F-4D97-AF65-F5344CB8AC3E}">
-        <p14:creationId xmlns:p14="http://schemas.microsoft.com/office/powerpoint/2010/main" val="2064379448"/>
+        <p14:creationId xmlns:p14="http://schemas.microsoft.com/office/powerpoint/2010/main" val="2119170476"/>
       </p:ext>
     </p:extLst>
   </p:cSld>
@@ -13417,8 +13867,247 @@
           <a:lstStyle/>
           <a:p>
             <a:r>
+              <a:rPr lang="en-US" dirty="0" err="1"/>
+              <a:t>NoneType</a:t>
+            </a:r>
+            <a:endParaRPr lang="en-US" dirty="0"/>
+          </a:p>
+        </p:txBody>
+      </p:sp>
+      <p:sp>
+        <p:nvSpPr>
+          <p:cNvPr id="9" name="Content Placeholder 8">
+            <a:extLst>
+              <a:ext uri="{FF2B5EF4-FFF2-40B4-BE49-F238E27FC236}">
+                <a16:creationId xmlns:a16="http://schemas.microsoft.com/office/drawing/2014/main" id="{E3B2E017-30B2-884B-A113-B419A2ED51AD}"/>
+              </a:ext>
+            </a:extLst>
+          </p:cNvPr>
+          <p:cNvSpPr>
+            <a:spLocks noGrp="1"/>
+          </p:cNvSpPr>
+          <p:nvPr>
+            <p:ph idx="1"/>
+          </p:nvPr>
+        </p:nvSpPr>
+        <p:spPr>
+          <a:xfrm>
+            <a:off x="483848" y="1150913"/>
+            <a:ext cx="8051725" cy="4440590"/>
+          </a:xfrm>
+        </p:spPr>
+        <p:txBody>
+          <a:bodyPr>
+            <a:noAutofit/>
+          </a:bodyPr>
+          <a:lstStyle/>
+          <a:p>
+            <a:pPr marL="0" indent="0">
+              <a:buNone/>
+            </a:pPr>
+            <a:endParaRPr lang="en-US" dirty="0"/>
+          </a:p>
+          <a:p>
+            <a:pPr marL="0" indent="0">
+              <a:buNone/>
+            </a:pPr>
+            <a:endParaRPr lang="en-US" dirty="0"/>
+          </a:p>
+          <a:p>
+            <a:pPr marL="0" indent="0">
+              <a:buNone/>
+            </a:pPr>
+            <a:r>
               <a:rPr lang="en-US" dirty="0"/>
-              <a:t>Lab 2</a:t>
+              <a:t>Python includes a special type, the </a:t>
+            </a:r>
+            <a:r>
+              <a:rPr lang="en-US" dirty="0" err="1"/>
+              <a:t>NoneType</a:t>
+            </a:r>
+            <a:r>
+              <a:rPr lang="en-US" dirty="0"/>
+              <a:t>, which has only a single possible value: None. </a:t>
+            </a:r>
+          </a:p>
+          <a:p>
+            <a:pPr marL="0" indent="0">
+              <a:buNone/>
+            </a:pPr>
+            <a:r>
+              <a:rPr lang="en-US" b="1" dirty="0">
+                <a:solidFill>
+                  <a:srgbClr val="000087"/>
+                </a:solidFill>
+                <a:latin typeface="Inconsolata Medium" panose="020B0609030003000000" pitchFamily="49" charset="77"/>
+              </a:rPr>
+              <a:t>In </a:t>
+            </a:r>
+            <a:r>
+              <a:rPr lang="en-US" b="1" dirty="0">
+                <a:latin typeface="Inconsolata Medium" panose="020B0609030003000000" pitchFamily="49" charset="77"/>
+              </a:rPr>
+              <a:t>[</a:t>
+            </a:r>
+            <a:r>
+              <a:rPr lang="en-US" b="1" dirty="0">
+                <a:solidFill>
+                  <a:srgbClr val="FF6600"/>
+                </a:solidFill>
+                <a:latin typeface="Inconsolata Medium" panose="020B0609030003000000" pitchFamily="49" charset="77"/>
+              </a:rPr>
+              <a:t>24</a:t>
+            </a:r>
+            <a:r>
+              <a:rPr lang="en-US" b="1" dirty="0">
+                <a:latin typeface="Inconsolata Medium" panose="020B0609030003000000" pitchFamily="49" charset="77"/>
+              </a:rPr>
+              <a:t>]: </a:t>
+            </a:r>
+            <a:r>
+              <a:rPr lang="en-US" b="1" dirty="0">
+                <a:solidFill>
+                  <a:srgbClr val="336666"/>
+                </a:solidFill>
+                <a:latin typeface="Inconsolata Medium" panose="020B0609030003000000" pitchFamily="49" charset="77"/>
+              </a:rPr>
+              <a:t>type</a:t>
+            </a:r>
+            <a:r>
+              <a:rPr lang="en-US" b="1" dirty="0">
+                <a:latin typeface="Inconsolata Medium" panose="020B0609030003000000" pitchFamily="49" charset="77"/>
+              </a:rPr>
+              <a:t>(</a:t>
+            </a:r>
+            <a:r>
+              <a:rPr lang="en-US" b="1" dirty="0">
+                <a:solidFill>
+                  <a:srgbClr val="336666"/>
+                </a:solidFill>
+                <a:latin typeface="Inconsolata Medium" panose="020B0609030003000000" pitchFamily="49" charset="77"/>
+              </a:rPr>
+              <a:t>None</a:t>
+            </a:r>
+            <a:r>
+              <a:rPr lang="en-US" b="1" dirty="0">
+                <a:latin typeface="Inconsolata Medium" panose="020B0609030003000000" pitchFamily="49" charset="77"/>
+              </a:rPr>
+              <a:t>) </a:t>
+            </a:r>
+          </a:p>
+          <a:p>
+            <a:pPr marL="0" indent="0">
+              <a:buNone/>
+            </a:pPr>
+            <a:r>
+              <a:rPr lang="en-US" b="1" dirty="0">
+                <a:latin typeface="Inconsolata Medium" panose="020B0609030003000000" pitchFamily="49" charset="77"/>
+              </a:rPr>
+              <a:t>Out [24]: </a:t>
+            </a:r>
+            <a:r>
+              <a:rPr lang="en-US" b="1" dirty="0" err="1">
+                <a:latin typeface="Inconsolata Medium" panose="020B0609030003000000" pitchFamily="49" charset="77"/>
+              </a:rPr>
+              <a:t>NoneType</a:t>
+            </a:r>
+            <a:r>
+              <a:rPr lang="en-US" b="1" dirty="0">
+                <a:latin typeface="Inconsolata Medium" panose="020B0609030003000000" pitchFamily="49" charset="77"/>
+              </a:rPr>
+              <a:t> </a:t>
+            </a:r>
+          </a:p>
+          <a:p>
+            <a:pPr marL="0" indent="0">
+              <a:buNone/>
+            </a:pPr>
+            <a:endParaRPr lang="en-US" dirty="0"/>
+          </a:p>
+          <a:p>
+            <a:pPr marL="0" indent="0">
+              <a:buNone/>
+            </a:pPr>
+            <a:r>
+              <a:rPr lang="en-US" dirty="0"/>
+              <a:t>None can is often used as the default value for parameters of methods. More on this later. </a:t>
+            </a:r>
+          </a:p>
+          <a:p>
+            <a:pPr marL="0" indent="0">
+              <a:buNone/>
+            </a:pPr>
+            <a:endParaRPr lang="en-US" dirty="0"/>
+          </a:p>
+          <a:p>
+            <a:pPr marL="0" indent="0">
+              <a:buNone/>
+            </a:pPr>
+            <a:endParaRPr lang="en-US" sz="1900" b="1" dirty="0">
+              <a:latin typeface="Inconsolata Medium" panose="020B0609030003000000" pitchFamily="49" charset="77"/>
+            </a:endParaRPr>
+          </a:p>
+        </p:txBody>
+      </p:sp>
+    </p:spTree>
+    <p:extLst>
+      <p:ext uri="{BB962C8B-B14F-4D97-AF65-F5344CB8AC3E}">
+        <p14:creationId xmlns:p14="http://schemas.microsoft.com/office/powerpoint/2010/main" val="2925367410"/>
+      </p:ext>
+    </p:extLst>
+  </p:cSld>
+  <p:clrMapOvr>
+    <a:masterClrMapping/>
+  </p:clrMapOvr>
+</p:sld>
+</file>
+
+<file path=ppt/slides/slide24.xml><?xml version="1.0" encoding="utf-8"?>
+<p:sld xmlns:a="http://schemas.openxmlformats.org/drawingml/2006/main" xmlns:r="http://schemas.openxmlformats.org/officeDocument/2006/relationships" xmlns:p="http://schemas.openxmlformats.org/presentationml/2006/main">
+  <p:cSld>
+    <p:spTree>
+      <p:nvGrpSpPr>
+        <p:cNvPr id="1" name=""/>
+        <p:cNvGrpSpPr/>
+        <p:nvPr/>
+      </p:nvGrpSpPr>
+      <p:grpSpPr>
+        <a:xfrm>
+          <a:off x="0" y="0"/>
+          <a:ext cx="0" cy="0"/>
+          <a:chOff x="0" y="0"/>
+          <a:chExt cx="0" cy="0"/>
+        </a:xfrm>
+      </p:grpSpPr>
+      <p:sp>
+        <p:nvSpPr>
+          <p:cNvPr id="2" name="Title 1">
+            <a:extLst>
+              <a:ext uri="{FF2B5EF4-FFF2-40B4-BE49-F238E27FC236}">
+                <a16:creationId xmlns:a16="http://schemas.microsoft.com/office/drawing/2014/main" id="{AA3A228F-61D0-D949-A5E7-F83756230BF8}"/>
+              </a:ext>
+            </a:extLst>
+          </p:cNvPr>
+          <p:cNvSpPr>
+            <a:spLocks noGrp="1"/>
+          </p:cNvSpPr>
+          <p:nvPr>
+            <p:ph type="title"/>
+          </p:nvPr>
+        </p:nvSpPr>
+        <p:spPr>
+          <a:xfrm>
+            <a:off x="483848" y="467027"/>
+            <a:ext cx="7053542" cy="683886"/>
+          </a:xfrm>
+        </p:spPr>
+        <p:txBody>
+          <a:bodyPr/>
+          <a:lstStyle/>
+          <a:p>
+            <a:r>
+              <a:rPr lang="en-US" dirty="0"/>
+              <a:t>Lab 1</a:t>
             </a:r>
           </a:p>
         </p:txBody>
@@ -13454,6 +14143,210 @@
             <a:pPr marL="0" indent="0">
               <a:buNone/>
             </a:pPr>
+            <a:r>
+              <a:rPr lang="en-US" dirty="0"/>
+              <a:t> Download and install Anaconda on your home computer. </a:t>
+            </a:r>
+          </a:p>
+          <a:p>
+            <a:pPr marL="0" indent="0">
+              <a:buNone/>
+            </a:pPr>
+            <a:r>
+              <a:rPr lang="en-US" dirty="0">
+                <a:hlinkClick r:id="rId2"/>
+              </a:rPr>
+              <a:t>https://www.anaconda.com/distribution/</a:t>
+            </a:r>
+            <a:endParaRPr lang="en-US" dirty="0"/>
+          </a:p>
+          <a:p>
+            <a:pPr marL="0" indent="0">
+              <a:buNone/>
+            </a:pPr>
+            <a:endParaRPr lang="en-US" dirty="0"/>
+          </a:p>
+          <a:p>
+            <a:pPr marL="0" indent="0">
+              <a:buNone/>
+            </a:pPr>
+            <a:r>
+              <a:rPr lang="en-US" dirty="0"/>
+              <a:t>On your computer. Open the </a:t>
+            </a:r>
+            <a:r>
+              <a:rPr lang="en-US" dirty="0" err="1"/>
+              <a:t>IPython</a:t>
+            </a:r>
+            <a:r>
+              <a:rPr lang="en-US" dirty="0"/>
+              <a:t> interpreter. Experiment with some of the concepts we learn:</a:t>
+            </a:r>
+          </a:p>
+          <a:p>
+            <a:pPr marL="0" indent="0">
+              <a:buNone/>
+            </a:pPr>
+            <a:endParaRPr lang="en-US" dirty="0"/>
+          </a:p>
+          <a:p>
+            <a:pPr marL="457200" indent="-457200">
+              <a:buAutoNum type="arabicParenR"/>
+            </a:pPr>
+            <a:r>
+              <a:rPr lang="en-US" dirty="0"/>
+              <a:t>Print some strings. Experiment with the “</a:t>
+            </a:r>
+            <a:r>
+              <a:rPr lang="en-US" dirty="0" err="1"/>
+              <a:t>sep</a:t>
+            </a:r>
+            <a:r>
+              <a:rPr lang="en-US" dirty="0"/>
+              <a:t>” and “end” parameters.</a:t>
+            </a:r>
+          </a:p>
+          <a:p>
+            <a:pPr marL="457200" indent="-457200">
+              <a:buAutoNum type="arabicParenR"/>
+            </a:pPr>
+            <a:r>
+              <a:rPr lang="en-US" dirty="0"/>
+              <a:t>Try division vs floor division with integers. </a:t>
+            </a:r>
+          </a:p>
+          <a:p>
+            <a:pPr marL="457200" indent="-457200">
+              <a:buAutoNum type="arabicParenR"/>
+            </a:pPr>
+            <a:r>
+              <a:rPr lang="en-US" dirty="0"/>
+              <a:t>Initialize some floating point variables in both standard decimal notation and in exponential notation.</a:t>
+            </a:r>
+          </a:p>
+          <a:p>
+            <a:pPr marL="457200" indent="-457200">
+              <a:buAutoNum type="arabicParenR"/>
+            </a:pPr>
+            <a:r>
+              <a:rPr lang="en-US" dirty="0"/>
+              <a:t>Experiment with the type() function. </a:t>
+            </a:r>
+          </a:p>
+          <a:p>
+            <a:pPr marL="457200" indent="-457200">
+              <a:buAutoNum type="arabicParenR"/>
+            </a:pPr>
+            <a:endParaRPr lang="en-US" dirty="0"/>
+          </a:p>
+          <a:p>
+            <a:pPr marL="457200" indent="-457200">
+              <a:buAutoNum type="arabicParenR"/>
+            </a:pPr>
+            <a:endParaRPr lang="en-US" dirty="0"/>
+          </a:p>
+          <a:p>
+            <a:pPr marL="457200" indent="-457200">
+              <a:buAutoNum type="arabicParenR"/>
+            </a:pPr>
+            <a:endParaRPr lang="en-US" dirty="0"/>
+          </a:p>
+        </p:txBody>
+      </p:sp>
+    </p:spTree>
+    <p:extLst>
+      <p:ext uri="{BB962C8B-B14F-4D97-AF65-F5344CB8AC3E}">
+        <p14:creationId xmlns:p14="http://schemas.microsoft.com/office/powerpoint/2010/main" val="2064379448"/>
+      </p:ext>
+    </p:extLst>
+  </p:cSld>
+  <p:clrMapOvr>
+    <a:masterClrMapping/>
+  </p:clrMapOvr>
+</p:sld>
+</file>
+
+<file path=ppt/slides/slide25.xml><?xml version="1.0" encoding="utf-8"?>
+<p:sld xmlns:a="http://schemas.openxmlformats.org/drawingml/2006/main" xmlns:r="http://schemas.openxmlformats.org/officeDocument/2006/relationships" xmlns:p="http://schemas.openxmlformats.org/presentationml/2006/main">
+  <p:cSld>
+    <p:spTree>
+      <p:nvGrpSpPr>
+        <p:cNvPr id="1" name=""/>
+        <p:cNvGrpSpPr/>
+        <p:nvPr/>
+      </p:nvGrpSpPr>
+      <p:grpSpPr>
+        <a:xfrm>
+          <a:off x="0" y="0"/>
+          <a:ext cx="0" cy="0"/>
+          <a:chOff x="0" y="0"/>
+          <a:chExt cx="0" cy="0"/>
+        </a:xfrm>
+      </p:grpSpPr>
+      <p:sp>
+        <p:nvSpPr>
+          <p:cNvPr id="2" name="Title 1">
+            <a:extLst>
+              <a:ext uri="{FF2B5EF4-FFF2-40B4-BE49-F238E27FC236}">
+                <a16:creationId xmlns:a16="http://schemas.microsoft.com/office/drawing/2014/main" id="{AA3A228F-61D0-D949-A5E7-F83756230BF8}"/>
+              </a:ext>
+            </a:extLst>
+          </p:cNvPr>
+          <p:cNvSpPr>
+            <a:spLocks noGrp="1"/>
+          </p:cNvSpPr>
+          <p:nvPr>
+            <p:ph type="title"/>
+          </p:nvPr>
+        </p:nvSpPr>
+        <p:spPr>
+          <a:xfrm>
+            <a:off x="483848" y="467027"/>
+            <a:ext cx="7053542" cy="683886"/>
+          </a:xfrm>
+        </p:spPr>
+        <p:txBody>
+          <a:bodyPr/>
+          <a:lstStyle/>
+          <a:p>
+            <a:r>
+              <a:rPr lang="en-US" dirty="0"/>
+              <a:t>Lab 2</a:t>
+            </a:r>
+          </a:p>
+        </p:txBody>
+      </p:sp>
+      <p:sp>
+        <p:nvSpPr>
+          <p:cNvPr id="9" name="Content Placeholder 8">
+            <a:extLst>
+              <a:ext uri="{FF2B5EF4-FFF2-40B4-BE49-F238E27FC236}">
+                <a16:creationId xmlns:a16="http://schemas.microsoft.com/office/drawing/2014/main" id="{E3B2E017-30B2-884B-A113-B419A2ED51AD}"/>
+              </a:ext>
+            </a:extLst>
+          </p:cNvPr>
+          <p:cNvSpPr>
+            <a:spLocks noGrp="1"/>
+          </p:cNvSpPr>
+          <p:nvPr>
+            <p:ph idx="1"/>
+          </p:nvPr>
+        </p:nvSpPr>
+        <p:spPr>
+          <a:xfrm>
+            <a:off x="483848" y="1150912"/>
+            <a:ext cx="8051725" cy="4564087"/>
+          </a:xfrm>
+        </p:spPr>
+        <p:txBody>
+          <a:bodyPr>
+            <a:noAutofit/>
+          </a:bodyPr>
+          <a:lstStyle/>
+          <a:p>
+            <a:pPr marL="0" indent="0">
+              <a:buNone/>
+            </a:pPr>
             <a:endParaRPr lang="en-US" dirty="0"/>
           </a:p>
           <a:p>
@@ -13554,7 +14447,7 @@
 </p:sld>
 </file>
 
-<file path=ppt/slides/slide24.xml><?xml version="1.0" encoding="utf-8"?>
+<file path=ppt/slides/slide26.xml><?xml version="1.0" encoding="utf-8"?>
 <p:sld xmlns:a="http://schemas.openxmlformats.org/drawingml/2006/main" xmlns:r="http://schemas.openxmlformats.org/officeDocument/2006/relationships" xmlns:p="http://schemas.openxmlformats.org/presentationml/2006/main">
   <p:cSld>
     <p:spTree>

</xml_diff>